<commit_message>
Update R32V2020-RISC in EP4CE6.pptx
</commit_message>
<xml_diff>
--- a/Architecture/Architecture Specs/R32V2020-RISC in EP4CE6.pptx
+++ b/Architecture/Architecture Specs/R32V2020-RISC in EP4CE6.pptx
@@ -9,8 +9,8 @@
     <p:sldId id="256" r:id="rId3"/>
     <p:sldId id="257" r:id="rId4"/>
     <p:sldId id="258" r:id="rId5"/>
-    <p:sldId id="259" r:id="rId6"/>
-    <p:sldId id="260" r:id="rId7"/>
+    <p:sldId id="260" r:id="rId6"/>
+    <p:sldId id="259" r:id="rId7"/>
     <p:sldId id="261" r:id="rId8"/>
     <p:sldId id="262" r:id="rId9"/>
     <p:sldId id="263" r:id="rId10"/>
@@ -3752,7 +3752,7 @@
         </p:style>
         <p:txBody>
           <a:bodyPr lIns="90000" tIns="45000" rIns="90000" bIns="45000">
-            <a:normAutofit/>
+            <a:normAutofit lnSpcReduction="10000"/>
           </a:bodyPr>
           <a:lstStyle/>
           <a:p>
@@ -3770,7 +3770,7 @@
               <a:buChar char="•"/>
             </a:pPr>
             <a:r>
-              <a:rPr lang="en-US" sz="3200" b="0" strike="noStrike" spc="-1">
+              <a:rPr lang="en-US" sz="3200" b="0" strike="noStrike" spc="-1" dirty="0">
                 <a:solidFill>
                   <a:srgbClr val="000000"/>
                 </a:solidFill>
@@ -3779,7 +3779,7 @@
               </a:rPr>
               <a:t>Four independent address spaces</a:t>
             </a:r>
-            <a:endParaRPr lang="en-US" sz="3200" b="0" strike="noStrike" spc="-1">
+            <a:endParaRPr lang="en-US" sz="3200" b="0" strike="noStrike" spc="-1" dirty="0">
               <a:latin typeface="Arial"/>
             </a:endParaRPr>
           </a:p>
@@ -3798,7 +3798,7 @@
               <a:buChar char="•"/>
             </a:pPr>
             <a:r>
-              <a:rPr lang="en-US" sz="2400" b="0" strike="noStrike" spc="-1">
+              <a:rPr lang="en-US" sz="2400" b="0" strike="noStrike" spc="-1" dirty="0">
                 <a:solidFill>
                   <a:srgbClr val="000000"/>
                 </a:solidFill>
@@ -3807,7 +3807,7 @@
               </a:rPr>
               <a:t>Instruction Space</a:t>
             </a:r>
-            <a:endParaRPr lang="en-US" sz="2400" b="0" strike="noStrike" spc="-1">
+            <a:endParaRPr lang="en-US" sz="2400" b="0" strike="noStrike" spc="-1" dirty="0">
               <a:latin typeface="Arial"/>
             </a:endParaRPr>
           </a:p>
@@ -3826,7 +3826,7 @@
               <a:buChar char="•"/>
             </a:pPr>
             <a:r>
-              <a:rPr lang="en-US" sz="2400" b="0" strike="noStrike" spc="-1">
+              <a:rPr lang="en-US" sz="2400" b="0" strike="noStrike" spc="-1" dirty="0">
                 <a:solidFill>
                   <a:srgbClr val="000000"/>
                 </a:solidFill>
@@ -3835,7 +3835,7 @@
               </a:rPr>
               <a:t>Peripheral Space</a:t>
             </a:r>
-            <a:endParaRPr lang="en-US" sz="2400" b="0" strike="noStrike" spc="-1">
+            <a:endParaRPr lang="en-US" sz="2400" b="0" strike="noStrike" spc="-1" dirty="0">
               <a:latin typeface="Arial"/>
             </a:endParaRPr>
           </a:p>
@@ -3854,7 +3854,7 @@
               <a:buChar char="•"/>
             </a:pPr>
             <a:r>
-              <a:rPr lang="en-US" sz="2400" b="0" strike="noStrike" spc="-1">
+              <a:rPr lang="en-US" sz="2400" b="0" strike="noStrike" spc="-1" dirty="0">
                 <a:solidFill>
                   <a:srgbClr val="000000"/>
                 </a:solidFill>
@@ -3863,7 +3863,7 @@
               </a:rPr>
               <a:t>Data Space</a:t>
             </a:r>
-            <a:endParaRPr lang="en-US" sz="2400" b="0" strike="noStrike" spc="-1">
+            <a:endParaRPr lang="en-US" sz="2400" b="0" strike="noStrike" spc="-1" dirty="0">
               <a:latin typeface="Arial"/>
             </a:endParaRPr>
           </a:p>
@@ -3882,7 +3882,7 @@
               <a:buChar char="•"/>
             </a:pPr>
             <a:r>
-              <a:rPr lang="en-US" sz="2400" b="0" strike="noStrike" spc="-1">
+              <a:rPr lang="en-US" sz="2400" b="0" strike="noStrike" spc="-1" dirty="0">
                 <a:solidFill>
                   <a:srgbClr val="000000"/>
                 </a:solidFill>
@@ -3891,7 +3891,7 @@
               </a:rPr>
               <a:t>Stack Space</a:t>
             </a:r>
-            <a:endParaRPr lang="en-US" sz="2400" b="0" strike="noStrike" spc="-1">
+            <a:endParaRPr lang="en-US" sz="2400" b="0" strike="noStrike" spc="-1" dirty="0">
               <a:latin typeface="Arial"/>
             </a:endParaRPr>
           </a:p>
@@ -3910,7 +3910,7 @@
               <a:buChar char="–"/>
             </a:pPr>
             <a:r>
-              <a:rPr lang="en-US" sz="2800" b="0" strike="noStrike" spc="-1">
+              <a:rPr lang="en-US" sz="2800" b="0" strike="noStrike" spc="-1" dirty="0">
                 <a:solidFill>
                   <a:srgbClr val="000000"/>
                 </a:solidFill>
@@ -3919,7 +3919,7 @@
               </a:rPr>
               <a:t>There is plenty of interconnect in the FPGA</a:t>
             </a:r>
-            <a:endParaRPr lang="en-US" sz="2800" b="0" strike="noStrike" spc="-1">
+            <a:endParaRPr lang="en-US" sz="2800" b="0" strike="noStrike" spc="-1" dirty="0">
               <a:latin typeface="Arial"/>
             </a:endParaRPr>
           </a:p>
@@ -3938,7 +3938,7 @@
               <a:buChar char="–"/>
             </a:pPr>
             <a:r>
-              <a:rPr lang="en-US" sz="2800" b="0" strike="noStrike" spc="-1">
+              <a:rPr lang="en-US" sz="2800" b="0" strike="noStrike" spc="-1" dirty="0">
                 <a:solidFill>
                   <a:srgbClr val="000000"/>
                 </a:solidFill>
@@ -3947,7 +3947,7 @@
               </a:rPr>
               <a:t>Reduces multiplexing</a:t>
             </a:r>
-            <a:endParaRPr lang="en-US" sz="2800" b="0" strike="noStrike" spc="-1">
+            <a:endParaRPr lang="en-US" sz="2800" b="0" strike="noStrike" spc="-1" dirty="0">
               <a:latin typeface="Arial"/>
             </a:endParaRPr>
           </a:p>
@@ -3966,7 +3966,7 @@
               <a:buChar char="•"/>
             </a:pPr>
             <a:r>
-              <a:rPr lang="en-US" sz="2400" b="0" strike="noStrike" spc="-1">
+              <a:rPr lang="en-US" sz="2400" b="0" strike="noStrike" spc="-1" dirty="0">
                 <a:solidFill>
                   <a:srgbClr val="000000"/>
                 </a:solidFill>
@@ -3975,7 +3975,7 @@
               </a:rPr>
               <a:t>All writes are posted (don’t block the CPU unless the bus is busy from the last write</a:t>
             </a:r>
-            <a:endParaRPr lang="en-US" sz="2400" b="0" strike="noStrike" spc="-1">
+            <a:endParaRPr lang="en-US" sz="2400" b="0" strike="noStrike" spc="-1" dirty="0">
               <a:latin typeface="Arial"/>
             </a:endParaRPr>
           </a:p>
@@ -3994,7 +3994,7 @@
               <a:buChar char="–"/>
             </a:pPr>
             <a:r>
-              <a:rPr lang="en-US" sz="2000" b="0" strike="noStrike" spc="-1">
+              <a:rPr lang="en-US" sz="2000" b="0" strike="noStrike" spc="-1" dirty="0">
                 <a:solidFill>
                   <a:srgbClr val="000000"/>
                 </a:solidFill>
@@ -4003,7 +4003,7 @@
               </a:rPr>
               <a:t>With internal SRAM for most spaces they won’t be</a:t>
             </a:r>
-            <a:endParaRPr lang="en-US" sz="2000" b="0" strike="noStrike" spc="-1">
+            <a:endParaRPr lang="en-US" sz="2000" b="0" strike="noStrike" spc="-1" dirty="0">
               <a:latin typeface="Arial"/>
             </a:endParaRPr>
           </a:p>
@@ -4022,16 +4022,36 @@
               <a:buChar char="–"/>
             </a:pPr>
             <a:r>
-              <a:rPr lang="en-US" sz="2000" b="0" strike="noStrike" spc="-1">
+              <a:rPr lang="en-US" sz="2000" b="0" strike="noStrike" spc="-1" dirty="0">
                 <a:solidFill>
                   <a:srgbClr val="000000"/>
                 </a:solidFill>
                 <a:latin typeface="Calibri"/>
                 <a:ea typeface="DejaVu Sans"/>
               </a:rPr>
-              <a:t>Peripheral bus could be busy with slow periph.</a:t>
-            </a:r>
-            <a:endParaRPr lang="en-US" sz="2000" b="0" strike="noStrike" spc="-1">
+              <a:t>Peripheral bus could be busy with slow </a:t>
+            </a:r>
+            <a:r>
+              <a:rPr lang="en-US" sz="2000" b="0" strike="noStrike" spc="-1" dirty="0" err="1">
+                <a:solidFill>
+                  <a:srgbClr val="000000"/>
+                </a:solidFill>
+                <a:latin typeface="Calibri"/>
+                <a:ea typeface="DejaVu Sans"/>
+              </a:rPr>
+              <a:t>periph</a:t>
+            </a:r>
+            <a:r>
+              <a:rPr lang="en-US" sz="2000" b="0" strike="noStrike" spc="-1" dirty="0">
+                <a:solidFill>
+                  <a:srgbClr val="000000"/>
+                </a:solidFill>
+                <a:latin typeface="Calibri"/>
+                <a:ea typeface="DejaVu Sans"/>
+              </a:rPr>
+              <a:t>.</a:t>
+            </a:r>
+            <a:endParaRPr lang="en-US" sz="2000" b="0" strike="noStrike" spc="-1" dirty="0">
               <a:latin typeface="Arial"/>
             </a:endParaRPr>
           </a:p>
@@ -4044,7 +4064,7 @@
                 <a:spcPts val="641"/>
               </a:spcBef>
             </a:pPr>
-            <a:endParaRPr lang="en-US" sz="2000" b="0" strike="noStrike" spc="-1">
+            <a:endParaRPr lang="en-US" sz="2000" b="0" strike="noStrike" spc="-1" dirty="0">
               <a:latin typeface="Arial"/>
             </a:endParaRPr>
           </a:p>
@@ -4382,7 +4402,7 @@
         </p:style>
         <p:txBody>
           <a:bodyPr lIns="90000" tIns="45000" rIns="90000" bIns="45000">
-            <a:normAutofit/>
+            <a:normAutofit lnSpcReduction="10000"/>
           </a:bodyPr>
           <a:lstStyle/>
           <a:p>
@@ -4971,7 +4991,7 @@
         </p:style>
         <p:txBody>
           <a:bodyPr lIns="90000" tIns="45000" rIns="90000" bIns="45000">
-            <a:normAutofit/>
+            <a:normAutofit fontScale="85000" lnSpcReduction="20000"/>
           </a:bodyPr>
           <a:lstStyle/>
           <a:p>
@@ -6163,7 +6183,7 @@
         </p:style>
         <p:txBody>
           <a:bodyPr lIns="90000" tIns="45000" rIns="90000" bIns="45000">
-            <a:normAutofit/>
+            <a:normAutofit fontScale="85000" lnSpcReduction="20000"/>
           </a:bodyPr>
           <a:lstStyle/>
           <a:p>
@@ -6181,7 +6201,7 @@
               <a:buChar char="•"/>
             </a:pPr>
             <a:r>
-              <a:rPr lang="en-US" sz="3200" b="0" strike="noStrike" spc="-1">
+              <a:rPr lang="en-US" sz="3200" b="0" strike="noStrike" spc="-1" dirty="0">
                 <a:solidFill>
                   <a:srgbClr val="000000"/>
                 </a:solidFill>
@@ -6190,7 +6210,7 @@
               </a:rPr>
               <a:t>Uses On-chip RAM</a:t>
             </a:r>
-            <a:endParaRPr lang="en-US" sz="3200" b="0" strike="noStrike" spc="-1">
+            <a:endParaRPr lang="en-US" sz="3200" b="0" strike="noStrike" spc="-1" dirty="0">
               <a:latin typeface="Arial"/>
             </a:endParaRPr>
           </a:p>
@@ -6209,7 +6229,7 @@
               <a:buChar char="•"/>
             </a:pPr>
             <a:r>
-              <a:rPr lang="en-US" sz="3200" b="0" strike="noStrike" spc="-1">
+              <a:rPr lang="en-US" sz="3200" b="0" strike="noStrike" spc="-1" dirty="0">
                 <a:solidFill>
                   <a:srgbClr val="000000"/>
                 </a:solidFill>
@@ -6218,7 +6238,7 @@
               </a:rPr>
               <a:t>16-bits of address is more than enough since there's limited space in internal RAM</a:t>
             </a:r>
-            <a:endParaRPr lang="en-US" sz="3200" b="0" strike="noStrike" spc="-1">
+            <a:endParaRPr lang="en-US" sz="3200" b="0" strike="noStrike" spc="-1" dirty="0">
               <a:latin typeface="Arial"/>
             </a:endParaRPr>
           </a:p>
@@ -6237,7 +6257,7 @@
               <a:buChar char="•"/>
             </a:pPr>
             <a:r>
-              <a:rPr lang="en-US" sz="3200" b="0" strike="noStrike" spc="-1">
+              <a:rPr lang="en-US" sz="3200" b="0" strike="noStrike" spc="-1" dirty="0">
                 <a:solidFill>
                   <a:srgbClr val="000000"/>
                 </a:solidFill>
@@ -6246,7 +6266,7 @@
               </a:rPr>
               <a:t>32 bits of data</a:t>
             </a:r>
-            <a:endParaRPr lang="en-US" sz="3200" b="0" strike="noStrike" spc="-1">
+            <a:endParaRPr lang="en-US" sz="3200" b="0" strike="noStrike" spc="-1" dirty="0">
               <a:latin typeface="Arial"/>
             </a:endParaRPr>
           </a:p>
@@ -6265,7 +6285,7 @@
               <a:buChar char="•"/>
             </a:pPr>
             <a:r>
-              <a:rPr lang="en-US" sz="3200" b="0" strike="noStrike" spc="-1">
+              <a:rPr lang="en-US" sz="3200" b="0" strike="noStrike" spc="-1" dirty="0">
                 <a:solidFill>
                   <a:srgbClr val="000000"/>
                 </a:solidFill>
@@ -6274,7 +6294,7 @@
               </a:rPr>
               <a:t>Subroutine calls need the stack pushed/pulled automatically</a:t>
             </a:r>
-            <a:endParaRPr lang="en-US" sz="3200" b="0" strike="noStrike" spc="-1">
+            <a:endParaRPr lang="en-US" sz="3200" b="0" strike="noStrike" spc="-1" dirty="0">
               <a:latin typeface="Arial"/>
             </a:endParaRPr>
           </a:p>
@@ -6293,7 +6313,7 @@
               <a:buChar char="–"/>
             </a:pPr>
             <a:r>
-              <a:rPr lang="en-US" sz="2800" b="0" strike="noStrike" spc="-1">
+              <a:rPr lang="en-US" sz="2800" b="0" strike="noStrike" spc="-1" dirty="0">
                 <a:solidFill>
                   <a:srgbClr val="000000"/>
                 </a:solidFill>
@@ -6302,7 +6322,7 @@
               </a:rPr>
               <a:t>Always Push registers at call</a:t>
             </a:r>
-            <a:endParaRPr lang="en-US" sz="2800" b="0" strike="noStrike" spc="-1">
+            <a:endParaRPr lang="en-US" sz="2800" b="0" strike="noStrike" spc="-1" dirty="0">
               <a:latin typeface="Arial"/>
             </a:endParaRPr>
           </a:p>
@@ -6321,7 +6341,7 @@
               <a:buChar char="–"/>
             </a:pPr>
             <a:r>
-              <a:rPr lang="en-US" sz="2800" b="0" strike="noStrike" spc="-1">
+              <a:rPr lang="en-US" sz="2800" b="0" strike="noStrike" spc="-1" dirty="0">
                 <a:solidFill>
                   <a:srgbClr val="000000"/>
                 </a:solidFill>
@@ -6330,7 +6350,7 @@
               </a:rPr>
               <a:t>Pull most registers at return</a:t>
             </a:r>
-            <a:endParaRPr lang="en-US" sz="2800" b="0" strike="noStrike" spc="-1">
+            <a:endParaRPr lang="en-US" sz="2800" b="0" strike="noStrike" spc="-1" dirty="0">
               <a:latin typeface="Arial"/>
             </a:endParaRPr>
           </a:p>
@@ -6349,7 +6369,7 @@
               <a:buChar char="•"/>
             </a:pPr>
             <a:r>
-              <a:rPr lang="en-US" sz="3200" b="0" strike="noStrike" spc="-1">
+              <a:rPr lang="en-US" sz="3200" b="0" strike="noStrike" spc="-1" dirty="0">
                 <a:solidFill>
                   <a:srgbClr val="000000"/>
                 </a:solidFill>
@@ -6358,7 +6378,7 @@
               </a:rPr>
               <a:t>Resources – stack depth</a:t>
             </a:r>
-            <a:endParaRPr lang="en-US" sz="3200" b="0" strike="noStrike" spc="-1">
+            <a:endParaRPr lang="en-US" sz="3200" b="0" strike="noStrike" spc="-1" dirty="0">
               <a:latin typeface="Arial"/>
             </a:endParaRPr>
           </a:p>
@@ -6377,7 +6397,7 @@
               <a:buChar char="–"/>
             </a:pPr>
             <a:r>
-              <a:rPr lang="en-US" sz="3200" b="0" strike="noStrike" spc="-1">
+              <a:rPr lang="en-US" sz="3200" b="0" strike="noStrike" spc="-1" dirty="0">
                 <a:solidFill>
                   <a:srgbClr val="000000"/>
                 </a:solidFill>
@@ -6386,7 +6406,7 @@
               </a:rPr>
               <a:t>16 registers, 2K stack = 128 levels deep</a:t>
             </a:r>
-            <a:endParaRPr lang="en-US" sz="3200" b="0" strike="noStrike" spc="-1">
+            <a:endParaRPr lang="en-US" sz="3200" b="0" strike="noStrike" spc="-1" dirty="0">
               <a:latin typeface="Arial"/>
             </a:endParaRPr>
           </a:p>
@@ -6405,7 +6425,7 @@
               <a:buChar char="–"/>
             </a:pPr>
             <a:r>
-              <a:rPr lang="en-US" sz="3200" b="0" strike="noStrike" spc="-1">
+              <a:rPr lang="en-US" sz="3200" b="0" strike="noStrike" spc="-1" dirty="0">
                 <a:solidFill>
                   <a:srgbClr val="000000"/>
                 </a:solidFill>
@@ -6414,7 +6434,7 @@
               </a:rPr>
               <a:t>Can’t corrupt address/instruction spaces</a:t>
             </a:r>
-            <a:endParaRPr lang="en-US" sz="3200" b="0" strike="noStrike" spc="-1">
+            <a:endParaRPr lang="en-US" sz="3200" b="0" strike="noStrike" spc="-1" dirty="0">
               <a:latin typeface="Arial"/>
             </a:endParaRPr>
           </a:p>
@@ -6752,7 +6772,7 @@
         </p:style>
         <p:txBody>
           <a:bodyPr lIns="90000" tIns="45000" rIns="90000" bIns="45000">
-            <a:normAutofit/>
+            <a:normAutofit fontScale="92500" lnSpcReduction="10000"/>
           </a:bodyPr>
           <a:lstStyle/>
           <a:p>
@@ -9174,7 +9194,7 @@
         </p:style>
         <p:txBody>
           <a:bodyPr lIns="90000" tIns="45000" rIns="90000" bIns="45000" anchor="ctr">
-            <a:normAutofit/>
+            <a:normAutofit fontScale="92500" lnSpcReduction="20000"/>
           </a:bodyPr>
           <a:lstStyle/>
           <a:p>
@@ -9586,16 +9606,36 @@
               <a:buChar char="•"/>
             </a:pPr>
             <a:r>
-              <a:rPr lang="en-US" sz="3200" b="0" strike="noStrike" spc="-1">
+              <a:rPr lang="en-US" sz="3200" b="0" strike="noStrike" spc="-1" dirty="0">
                 <a:solidFill>
                   <a:srgbClr val="000000"/>
                 </a:solidFill>
                 <a:latin typeface="Calibri"/>
                 <a:ea typeface="DejaVu Sans"/>
               </a:rPr>
-              <a:t>Hardware that has already been tested with the Multicomp project</a:t>
-            </a:r>
-            <a:endParaRPr lang="en-US" sz="3200" b="0" strike="noStrike" spc="-1">
+              <a:t>Hardware that has already been tested with the </a:t>
+            </a:r>
+            <a:r>
+              <a:rPr lang="en-US" sz="3200" b="0" strike="noStrike" spc="-1" dirty="0" err="1">
+                <a:solidFill>
+                  <a:srgbClr val="000000"/>
+                </a:solidFill>
+                <a:latin typeface="Calibri"/>
+                <a:ea typeface="DejaVu Sans"/>
+              </a:rPr>
+              <a:t>Multicomp</a:t>
+            </a:r>
+            <a:r>
+              <a:rPr lang="en-US" sz="3200" b="0" strike="noStrike" spc="-1" dirty="0">
+                <a:solidFill>
+                  <a:srgbClr val="000000"/>
+                </a:solidFill>
+                <a:latin typeface="Calibri"/>
+                <a:ea typeface="DejaVu Sans"/>
+              </a:rPr>
+              <a:t> project</a:t>
+            </a:r>
+            <a:endParaRPr lang="en-US" sz="3200" b="0" strike="noStrike" spc="-1" dirty="0">
               <a:latin typeface="Arial"/>
             </a:endParaRPr>
           </a:p>
@@ -9614,7 +9654,7 @@
               <a:buChar char="–"/>
             </a:pPr>
             <a:r>
-              <a:rPr lang="en-US" sz="2800" b="0" strike="noStrike" spc="-1">
+              <a:rPr lang="en-US" sz="2800" b="0" strike="noStrike" spc="-1" dirty="0">
                 <a:solidFill>
                   <a:srgbClr val="000000"/>
                 </a:solidFill>
@@ -9623,7 +9663,7 @@
               </a:rPr>
               <a:t>Altera EP4CE6 FPGA – 50 MHz clock</a:t>
             </a:r>
-            <a:endParaRPr lang="en-US" sz="2800" b="0" strike="noStrike" spc="-1">
+            <a:endParaRPr lang="en-US" sz="2800" b="0" strike="noStrike" spc="-1" dirty="0">
               <a:latin typeface="Arial"/>
             </a:endParaRPr>
           </a:p>
@@ -9642,7 +9682,7 @@
               <a:buChar char="–"/>
             </a:pPr>
             <a:r>
-              <a:rPr lang="en-US" sz="2800" b="0" strike="noStrike" spc="-1">
+              <a:rPr lang="en-US" sz="2800" b="0" strike="noStrike" spc="-1" dirty="0">
                 <a:solidFill>
                   <a:srgbClr val="000000"/>
                 </a:solidFill>
@@ -9651,7 +9691,7 @@
               </a:rPr>
               <a:t>USB-Serial</a:t>
             </a:r>
-            <a:endParaRPr lang="en-US" sz="2800" b="0" strike="noStrike" spc="-1">
+            <a:endParaRPr lang="en-US" sz="2800" b="0" strike="noStrike" spc="-1" dirty="0">
               <a:latin typeface="Arial"/>
             </a:endParaRPr>
           </a:p>
@@ -9670,7 +9710,7 @@
               <a:buChar char="–"/>
             </a:pPr>
             <a:r>
-              <a:rPr lang="en-US" sz="2800" b="0" strike="noStrike" spc="-1">
+              <a:rPr lang="en-US" sz="2800" b="0" strike="noStrike" spc="-1" dirty="0">
                 <a:solidFill>
                   <a:srgbClr val="000000"/>
                 </a:solidFill>
@@ -9679,7 +9719,7 @@
               </a:rPr>
               <a:t>PS/2 keyboard</a:t>
             </a:r>
-            <a:endParaRPr lang="en-US" sz="2800" b="0" strike="noStrike" spc="-1">
+            <a:endParaRPr lang="en-US" sz="2800" b="0" strike="noStrike" spc="-1" dirty="0">
               <a:latin typeface="Arial"/>
             </a:endParaRPr>
           </a:p>
@@ -9698,7 +9738,7 @@
               <a:buChar char="–"/>
             </a:pPr>
             <a:r>
-              <a:rPr lang="en-US" sz="2800" b="0" strike="noStrike" spc="-1">
+              <a:rPr lang="en-US" sz="2800" b="0" strike="noStrike" spc="-1" dirty="0">
                 <a:solidFill>
                   <a:srgbClr val="000000"/>
                 </a:solidFill>
@@ -9707,7 +9747,7 @@
               </a:rPr>
               <a:t>VGA</a:t>
             </a:r>
-            <a:endParaRPr lang="en-US" sz="2800" b="0" strike="noStrike" spc="-1">
+            <a:endParaRPr lang="en-US" sz="2800" b="0" strike="noStrike" spc="-1" dirty="0">
               <a:latin typeface="Arial"/>
             </a:endParaRPr>
           </a:p>
@@ -9726,7 +9766,7 @@
               <a:buChar char="–"/>
             </a:pPr>
             <a:r>
-              <a:rPr lang="en-US" sz="2800" b="0" strike="noStrike" spc="-1">
+              <a:rPr lang="en-US" sz="2800" b="0" strike="noStrike" spc="-1" dirty="0">
                 <a:solidFill>
                   <a:srgbClr val="000000"/>
                 </a:solidFill>
@@ -9735,7 +9775,7 @@
               </a:rPr>
               <a:t>Keys, LEDs, Buzzer</a:t>
             </a:r>
-            <a:endParaRPr lang="en-US" sz="2800" b="0" strike="noStrike" spc="-1">
+            <a:endParaRPr lang="en-US" sz="2800" b="0" strike="noStrike" spc="-1" dirty="0">
               <a:latin typeface="Arial"/>
             </a:endParaRPr>
           </a:p>
@@ -9754,7 +9794,7 @@
               <a:buChar char="–"/>
             </a:pPr>
             <a:r>
-              <a:rPr lang="en-US" sz="2800" b="0" strike="noStrike" spc="-1">
+              <a:rPr lang="en-US" sz="2800" b="0" strike="noStrike" spc="-1" dirty="0">
                 <a:solidFill>
                   <a:srgbClr val="000000"/>
                 </a:solidFill>
@@ -9763,7 +9803,7 @@
               </a:rPr>
               <a:t>4 digit, 7 segment display</a:t>
             </a:r>
-            <a:endParaRPr lang="en-US" sz="2800" b="0" strike="noStrike" spc="-1">
+            <a:endParaRPr lang="en-US" sz="2800" b="0" strike="noStrike" spc="-1" dirty="0">
               <a:latin typeface="Arial"/>
             </a:endParaRPr>
           </a:p>
@@ -9773,7 +9813,7 @@
                 <a:spcPct val="100000"/>
               </a:lnSpc>
             </a:pPr>
-            <a:endParaRPr lang="en-US" sz="2800" b="0" strike="noStrike" spc="-1">
+            <a:endParaRPr lang="en-US" sz="2800" b="0" strike="noStrike" spc="-1" dirty="0">
               <a:latin typeface="Arial"/>
             </a:endParaRPr>
           </a:p>
@@ -10001,7 +10041,7 @@
       </p:grpSpPr>
       <p:sp>
         <p:nvSpPr>
-          <p:cNvPr id="90" name="CustomShape 1"/>
+          <p:cNvPr id="95" name="CustomShape 1"/>
           <p:cNvSpPr/>
           <p:nvPr/>
         </p:nvSpPr>
@@ -10031,7 +10071,9 @@
           <a:fontRef idx="minor"/>
         </p:style>
         <p:txBody>
-          <a:bodyPr lIns="90000" tIns="45000" rIns="90000" bIns="45000" anchor="ctr"/>
+          <a:bodyPr lIns="90000" tIns="45000" rIns="90000" bIns="45000" anchor="ctr">
+            <a:normAutofit fontScale="92500" lnSpcReduction="20000"/>
+          </a:bodyPr>
           <a:lstStyle/>
           <a:p>
             <a:pPr algn="ctr">
@@ -10047,7 +10089,21 @@
                 <a:latin typeface="Calibri"/>
                 <a:ea typeface="DejaVu Sans"/>
               </a:rPr>
-              <a:t>EP4 On-card Resources (cont’d)</a:t>
+              <a:t>VHDL Peripherals</a:t>
+            </a:r>
+            <a:r>
+              <a:t/>
+            </a:r>
+            <a:br/>
+            <a:r>
+              <a:rPr lang="en-US" sz="4400" b="0" strike="noStrike" spc="-1">
+                <a:solidFill>
+                  <a:srgbClr val="000000"/>
+                </a:solidFill>
+                <a:latin typeface="Calibri"/>
+                <a:ea typeface="DejaVu Sans"/>
+              </a:rPr>
+              <a:t>(tested with Multicomp)</a:t>
             </a:r>
             <a:endParaRPr lang="en-US" sz="4400" b="0" strike="noStrike" spc="-1">
               <a:latin typeface="Arial"/>
@@ -10057,7 +10113,7 @@
       </p:sp>
       <p:sp>
         <p:nvSpPr>
-          <p:cNvPr id="91" name="CustomShape 2"/>
+          <p:cNvPr id="96" name="CustomShape 2"/>
           <p:cNvSpPr/>
           <p:nvPr/>
         </p:nvSpPr>
@@ -10087,9 +10143,7 @@
           <a:fontRef idx="minor"/>
         </p:style>
         <p:txBody>
-          <a:bodyPr lIns="90000" tIns="45000" rIns="90000" bIns="45000">
-            <a:normAutofit/>
-          </a:bodyPr>
+          <a:bodyPr lIns="90000" tIns="45000" rIns="90000" bIns="45000"/>
           <a:lstStyle/>
           <a:p>
             <a:pPr marL="343080" indent="-342000">
@@ -10113,7 +10167,7 @@
                 <a:latin typeface="Calibri"/>
                 <a:ea typeface="DejaVu Sans"/>
               </a:rPr>
-              <a:t>Hardware not yet tested with Multicomp</a:t>
+              <a:t>VGA (2/2/2 video mode)</a:t>
             </a:r>
             <a:endParaRPr lang="en-US" sz="3200" b="0" strike="noStrike" spc="-1">
               <a:latin typeface="Arial"/>
@@ -10141,36 +10195,7 @@
                 <a:latin typeface="Calibri"/>
                 <a:ea typeface="DejaVu Sans"/>
               </a:rPr>
-              <a:t>SDRAM</a:t>
-            </a:r>
-            <a:endParaRPr lang="en-US" sz="2800" b="0" strike="noStrike" spc="-1">
-              <a:latin typeface="Arial"/>
-            </a:endParaRPr>
-          </a:p>
-          <a:p>
-            <a:pPr marL="648000" lvl="2" indent="-215640">
-              <a:lnSpc>
-                <a:spcPct val="100000"/>
-              </a:lnSpc>
-              <a:spcBef>
-                <a:spcPts val="561"/>
-              </a:spcBef>
-              <a:buClr>
-                <a:srgbClr val="000000"/>
-              </a:buClr>
-              <a:buSzPct val="45000"/>
-              <a:buFont typeface="Wingdings" charset="2"/>
-              <a:buChar char=""/>
-            </a:pPr>
-            <a:r>
-              <a:rPr lang="en-US" sz="2800" b="0" strike="noStrike" spc="-1">
-                <a:solidFill>
-                  <a:srgbClr val="000000"/>
-                </a:solidFill>
-                <a:latin typeface="Calibri"/>
-                <a:ea typeface="DejaVu Sans"/>
-              </a:rPr>
-              <a:t>Not required but would be nice for larger instruction space</a:t>
+              <a:t>Memory Mapped character display (64x32)</a:t>
             </a:r>
             <a:endParaRPr lang="en-US" sz="2800" b="0" strike="noStrike" spc="-1">
               <a:latin typeface="Arial"/>
@@ -10198,9 +10223,65 @@
                 <a:latin typeface="Calibri"/>
                 <a:ea typeface="DejaVu Sans"/>
               </a:rPr>
-              <a:t>A/D</a:t>
+              <a:t>ANSI terminal (UART emulation) display (80x32)</a:t>
             </a:r>
             <a:endParaRPr lang="en-US" sz="2800" b="0" strike="noStrike" spc="-1">
+              <a:latin typeface="Arial"/>
+            </a:endParaRPr>
+          </a:p>
+          <a:p>
+            <a:pPr marL="343080" indent="-342000">
+              <a:lnSpc>
+                <a:spcPct val="100000"/>
+              </a:lnSpc>
+              <a:spcBef>
+                <a:spcPts val="641"/>
+              </a:spcBef>
+              <a:buClr>
+                <a:srgbClr val="000000"/>
+              </a:buClr>
+              <a:buFont typeface="Arial"/>
+              <a:buChar char="•"/>
+            </a:pPr>
+            <a:r>
+              <a:rPr lang="en-US" sz="3200" b="0" strike="noStrike" spc="-1">
+                <a:solidFill>
+                  <a:srgbClr val="000000"/>
+                </a:solidFill>
+                <a:latin typeface="Calibri"/>
+                <a:ea typeface="DejaVu Sans"/>
+              </a:rPr>
+              <a:t>PS/2 Interface (connector on card)</a:t>
+            </a:r>
+            <a:endParaRPr lang="en-US" sz="3200" b="0" strike="noStrike" spc="-1">
+              <a:latin typeface="Arial"/>
+            </a:endParaRPr>
+          </a:p>
+          <a:p>
+            <a:pPr marL="343080" indent="-342000">
+              <a:lnSpc>
+                <a:spcPct val="100000"/>
+              </a:lnSpc>
+              <a:spcBef>
+                <a:spcPts val="641"/>
+              </a:spcBef>
+              <a:buClr>
+                <a:srgbClr val="000000"/>
+              </a:buClr>
+              <a:buFont typeface="Arial"/>
+              <a:buChar char="•"/>
+            </a:pPr>
+            <a:r>
+              <a:rPr lang="en-US" sz="3200" b="0" strike="noStrike" spc="-1">
+                <a:solidFill>
+                  <a:srgbClr val="000000"/>
+                </a:solidFill>
+                <a:latin typeface="Calibri"/>
+                <a:ea typeface="DejaVu Sans"/>
+              </a:rPr>
+              <a:t>UART</a:t>
+            </a:r>
+            <a:endParaRPr lang="en-US" sz="3200" b="0" strike="noStrike" spc="-1">
               <a:latin typeface="Arial"/>
             </a:endParaRPr>
           </a:p>
@@ -10226,9 +10307,37 @@
                 <a:latin typeface="Calibri"/>
                 <a:ea typeface="DejaVu Sans"/>
               </a:rPr>
-              <a:t>IR receiver</a:t>
+              <a:t>6850 ACIA (via USB-Serial interface)</a:t>
             </a:r>
             <a:endParaRPr lang="en-US" sz="2800" b="0" strike="noStrike" spc="-1">
+              <a:latin typeface="Arial"/>
+            </a:endParaRPr>
+          </a:p>
+          <a:p>
+            <a:pPr marL="343080" indent="-342000">
+              <a:lnSpc>
+                <a:spcPct val="100000"/>
+              </a:lnSpc>
+              <a:spcBef>
+                <a:spcPts val="641"/>
+              </a:spcBef>
+              <a:buClr>
+                <a:srgbClr val="000000"/>
+              </a:buClr>
+              <a:buFont typeface="Arial"/>
+              <a:buChar char="•"/>
+            </a:pPr>
+            <a:r>
+              <a:rPr lang="en-US" sz="3200" b="0" strike="noStrike" spc="-1">
+                <a:solidFill>
+                  <a:srgbClr val="000000"/>
+                </a:solidFill>
+                <a:latin typeface="Calibri"/>
+                <a:ea typeface="DejaVu Sans"/>
+              </a:rPr>
+              <a:t>Sound</a:t>
+            </a:r>
+            <a:endParaRPr lang="en-US" sz="3200" b="0" strike="noStrike" spc="-1">
               <a:latin typeface="Arial"/>
             </a:endParaRPr>
           </a:p>
@@ -10254,30 +10363,17 @@
                 <a:latin typeface="Calibri"/>
                 <a:ea typeface="DejaVu Sans"/>
               </a:rPr>
-              <a:t>Serial EEPROM</a:t>
+              <a:t>Various from buzzes to tones</a:t>
             </a:r>
             <a:endParaRPr lang="en-US" sz="2800" b="0" strike="noStrike" spc="-1">
               <a:latin typeface="Arial"/>
             </a:endParaRPr>
           </a:p>
-          <a:p>
-            <a:pPr>
-              <a:lnSpc>
-                <a:spcPct val="100000"/>
-              </a:lnSpc>
-              <a:spcBef>
-                <a:spcPts val="561"/>
-              </a:spcBef>
-            </a:pPr>
-            <a:endParaRPr lang="en-US" sz="2800" b="0" strike="noStrike" spc="-1">
-              <a:latin typeface="Arial"/>
-            </a:endParaRPr>
-          </a:p>
-        </p:txBody>
-      </p:sp>
-      <p:sp>
-        <p:nvSpPr>
-          <p:cNvPr id="92" name="CustomShape 3"/>
+        </p:txBody>
+      </p:sp>
+      <p:sp>
+        <p:nvSpPr>
+          <p:cNvPr id="97" name="CustomShape 3"/>
           <p:cNvSpPr/>
           <p:nvPr/>
         </p:nvSpPr>
@@ -10315,7 +10411,7 @@
                 <a:spcPct val="100000"/>
               </a:lnSpc>
             </a:pPr>
-            <a:fld id="{81DC2A72-A33E-45CB-A0FC-944ED84863A3}" type="datetime1">
+            <a:fld id="{B1B28CAC-98BE-438C-A90B-9EE8A852AB53}" type="datetime1">
               <a:rPr lang="en-US" sz="1200" b="0" strike="noStrike" spc="-1">
                 <a:solidFill>
                   <a:srgbClr val="8B8B8B"/>
@@ -10333,7 +10429,7 @@
       </p:sp>
       <p:sp>
         <p:nvSpPr>
-          <p:cNvPr id="93" name="CustomShape 4"/>
+          <p:cNvPr id="98" name="CustomShape 4"/>
           <p:cNvSpPr/>
           <p:nvPr/>
         </p:nvSpPr>
@@ -10389,7 +10485,7 @@
       </p:sp>
       <p:sp>
         <p:nvSpPr>
-          <p:cNvPr id="94" name="CustomShape 5"/>
+          <p:cNvPr id="99" name="CustomShape 5"/>
           <p:cNvSpPr/>
           <p:nvPr/>
         </p:nvSpPr>
@@ -10427,7 +10523,7 @@
                 <a:spcPct val="100000"/>
               </a:lnSpc>
             </a:pPr>
-            <a:fld id="{AFA6D8E6-8CD0-4C9D-8BDE-1DE6094BA3CC}" type="slidenum">
+            <a:fld id="{0919CC1E-424D-4883-9099-73C515E82F43}" type="slidenum">
               <a:rPr lang="en-US" sz="1200" b="0" strike="noStrike" spc="-1">
                 <a:solidFill>
                   <a:srgbClr val="8B8B8B"/>
@@ -10497,7 +10593,7 @@
       </p:grpSpPr>
       <p:sp>
         <p:nvSpPr>
-          <p:cNvPr id="95" name="CustomShape 1"/>
+          <p:cNvPr id="90" name="CustomShape 1"/>
           <p:cNvSpPr/>
           <p:nvPr/>
         </p:nvSpPr>
@@ -10527,9 +10623,7 @@
           <a:fontRef idx="minor"/>
         </p:style>
         <p:txBody>
-          <a:bodyPr lIns="90000" tIns="45000" rIns="90000" bIns="45000" anchor="ctr">
-            <a:normAutofit/>
-          </a:bodyPr>
+          <a:bodyPr lIns="90000" tIns="45000" rIns="90000" bIns="45000" anchor="ctr"/>
           <a:lstStyle/>
           <a:p>
             <a:pPr algn="ctr">
@@ -10545,21 +10639,7 @@
                 <a:latin typeface="Calibri"/>
                 <a:ea typeface="DejaVu Sans"/>
               </a:rPr>
-              <a:t>VHDL Peripherals</a:t>
-            </a:r>
-            <a:r>
-              <a:t/>
-            </a:r>
-            <a:br/>
-            <a:r>
-              <a:rPr lang="en-US" sz="4400" b="0" strike="noStrike" spc="-1">
-                <a:solidFill>
-                  <a:srgbClr val="000000"/>
-                </a:solidFill>
-                <a:latin typeface="Calibri"/>
-                <a:ea typeface="DejaVu Sans"/>
-              </a:rPr>
-              <a:t>(tested with Multicomp)</a:t>
+              <a:t>EP4 On-card Resources (cont’d)</a:t>
             </a:r>
             <a:endParaRPr lang="en-US" sz="4400" b="0" strike="noStrike" spc="-1">
               <a:latin typeface="Arial"/>
@@ -10569,7 +10649,7 @@
       </p:sp>
       <p:sp>
         <p:nvSpPr>
-          <p:cNvPr id="96" name="CustomShape 2"/>
+          <p:cNvPr id="91" name="CustomShape 2"/>
           <p:cNvSpPr/>
           <p:nvPr/>
         </p:nvSpPr>
@@ -10599,7 +10679,9 @@
           <a:fontRef idx="minor"/>
         </p:style>
         <p:txBody>
-          <a:bodyPr lIns="90000" tIns="45000" rIns="90000" bIns="45000"/>
+          <a:bodyPr lIns="90000" tIns="45000" rIns="90000" bIns="45000">
+            <a:normAutofit/>
+          </a:bodyPr>
           <a:lstStyle/>
           <a:p>
             <a:pPr marL="343080" indent="-342000">
@@ -10623,7 +10705,7 @@
                 <a:latin typeface="Calibri"/>
                 <a:ea typeface="DejaVu Sans"/>
               </a:rPr>
-              <a:t>VGA (2/2/2 video mode)</a:t>
+              <a:t>Hardware not yet tested with Multicomp</a:t>
             </a:r>
             <a:endParaRPr lang="en-US" sz="3200" b="0" strike="noStrike" spc="-1">
               <a:latin typeface="Arial"/>
@@ -10651,7 +10733,36 @@
                 <a:latin typeface="Calibri"/>
                 <a:ea typeface="DejaVu Sans"/>
               </a:rPr>
-              <a:t>Memory Mapped character display (64x32)</a:t>
+              <a:t>SDRAM</a:t>
+            </a:r>
+            <a:endParaRPr lang="en-US" sz="2800" b="0" strike="noStrike" spc="-1">
+              <a:latin typeface="Arial"/>
+            </a:endParaRPr>
+          </a:p>
+          <a:p>
+            <a:pPr marL="648000" lvl="2" indent="-215640">
+              <a:lnSpc>
+                <a:spcPct val="100000"/>
+              </a:lnSpc>
+              <a:spcBef>
+                <a:spcPts val="561"/>
+              </a:spcBef>
+              <a:buClr>
+                <a:srgbClr val="000000"/>
+              </a:buClr>
+              <a:buSzPct val="45000"/>
+              <a:buFont typeface="Wingdings" charset="2"/>
+              <a:buChar char=""/>
+            </a:pPr>
+            <a:r>
+              <a:rPr lang="en-US" sz="2800" b="0" strike="noStrike" spc="-1">
+                <a:solidFill>
+                  <a:srgbClr val="000000"/>
+                </a:solidFill>
+                <a:latin typeface="Calibri"/>
+                <a:ea typeface="DejaVu Sans"/>
+              </a:rPr>
+              <a:t>Not required but would be nice for larger instruction space</a:t>
             </a:r>
             <a:endParaRPr lang="en-US" sz="2800" b="0" strike="noStrike" spc="-1">
               <a:latin typeface="Arial"/>
@@ -10679,65 +10790,9 @@
                 <a:latin typeface="Calibri"/>
                 <a:ea typeface="DejaVu Sans"/>
               </a:rPr>
-              <a:t>ANSI terminal (UART emulation) display (80x32)</a:t>
+              <a:t>A/D</a:t>
             </a:r>
             <a:endParaRPr lang="en-US" sz="2800" b="0" strike="noStrike" spc="-1">
-              <a:latin typeface="Arial"/>
-            </a:endParaRPr>
-          </a:p>
-          <a:p>
-            <a:pPr marL="343080" indent="-342000">
-              <a:lnSpc>
-                <a:spcPct val="100000"/>
-              </a:lnSpc>
-              <a:spcBef>
-                <a:spcPts val="641"/>
-              </a:spcBef>
-              <a:buClr>
-                <a:srgbClr val="000000"/>
-              </a:buClr>
-              <a:buFont typeface="Arial"/>
-              <a:buChar char="•"/>
-            </a:pPr>
-            <a:r>
-              <a:rPr lang="en-US" sz="3200" b="0" strike="noStrike" spc="-1">
-                <a:solidFill>
-                  <a:srgbClr val="000000"/>
-                </a:solidFill>
-                <a:latin typeface="Calibri"/>
-                <a:ea typeface="DejaVu Sans"/>
-              </a:rPr>
-              <a:t>PS/2 Interface (connector on card)</a:t>
-            </a:r>
-            <a:endParaRPr lang="en-US" sz="3200" b="0" strike="noStrike" spc="-1">
-              <a:latin typeface="Arial"/>
-            </a:endParaRPr>
-          </a:p>
-          <a:p>
-            <a:pPr marL="343080" indent="-342000">
-              <a:lnSpc>
-                <a:spcPct val="100000"/>
-              </a:lnSpc>
-              <a:spcBef>
-                <a:spcPts val="641"/>
-              </a:spcBef>
-              <a:buClr>
-                <a:srgbClr val="000000"/>
-              </a:buClr>
-              <a:buFont typeface="Arial"/>
-              <a:buChar char="•"/>
-            </a:pPr>
-            <a:r>
-              <a:rPr lang="en-US" sz="3200" b="0" strike="noStrike" spc="-1">
-                <a:solidFill>
-                  <a:srgbClr val="000000"/>
-                </a:solidFill>
-                <a:latin typeface="Calibri"/>
-                <a:ea typeface="DejaVu Sans"/>
-              </a:rPr>
-              <a:t>UART</a:t>
-            </a:r>
-            <a:endParaRPr lang="en-US" sz="3200" b="0" strike="noStrike" spc="-1">
               <a:latin typeface="Arial"/>
             </a:endParaRPr>
           </a:p>
@@ -10763,37 +10818,9 @@
                 <a:latin typeface="Calibri"/>
                 <a:ea typeface="DejaVu Sans"/>
               </a:rPr>
-              <a:t>6850 ACIA (via USB-Serial interface)</a:t>
+              <a:t>IR receiver</a:t>
             </a:r>
             <a:endParaRPr lang="en-US" sz="2800" b="0" strike="noStrike" spc="-1">
-              <a:latin typeface="Arial"/>
-            </a:endParaRPr>
-          </a:p>
-          <a:p>
-            <a:pPr marL="343080" indent="-342000">
-              <a:lnSpc>
-                <a:spcPct val="100000"/>
-              </a:lnSpc>
-              <a:spcBef>
-                <a:spcPts val="641"/>
-              </a:spcBef>
-              <a:buClr>
-                <a:srgbClr val="000000"/>
-              </a:buClr>
-              <a:buFont typeface="Arial"/>
-              <a:buChar char="•"/>
-            </a:pPr>
-            <a:r>
-              <a:rPr lang="en-US" sz="3200" b="0" strike="noStrike" spc="-1">
-                <a:solidFill>
-                  <a:srgbClr val="000000"/>
-                </a:solidFill>
-                <a:latin typeface="Calibri"/>
-                <a:ea typeface="DejaVu Sans"/>
-              </a:rPr>
-              <a:t>Sound</a:t>
-            </a:r>
-            <a:endParaRPr lang="en-US" sz="3200" b="0" strike="noStrike" spc="-1">
               <a:latin typeface="Arial"/>
             </a:endParaRPr>
           </a:p>
@@ -10819,17 +10846,30 @@
                 <a:latin typeface="Calibri"/>
                 <a:ea typeface="DejaVu Sans"/>
               </a:rPr>
-              <a:t>Various from buzzes to tones</a:t>
+              <a:t>Serial EEPROM</a:t>
             </a:r>
             <a:endParaRPr lang="en-US" sz="2800" b="0" strike="noStrike" spc="-1">
               <a:latin typeface="Arial"/>
             </a:endParaRPr>
           </a:p>
-        </p:txBody>
-      </p:sp>
-      <p:sp>
-        <p:nvSpPr>
-          <p:cNvPr id="97" name="CustomShape 3"/>
+          <a:p>
+            <a:pPr>
+              <a:lnSpc>
+                <a:spcPct val="100000"/>
+              </a:lnSpc>
+              <a:spcBef>
+                <a:spcPts val="561"/>
+              </a:spcBef>
+            </a:pPr>
+            <a:endParaRPr lang="en-US" sz="2800" b="0" strike="noStrike" spc="-1">
+              <a:latin typeface="Arial"/>
+            </a:endParaRPr>
+          </a:p>
+        </p:txBody>
+      </p:sp>
+      <p:sp>
+        <p:nvSpPr>
+          <p:cNvPr id="92" name="CustomShape 3"/>
           <p:cNvSpPr/>
           <p:nvPr/>
         </p:nvSpPr>
@@ -10867,7 +10907,7 @@
                 <a:spcPct val="100000"/>
               </a:lnSpc>
             </a:pPr>
-            <a:fld id="{B1B28CAC-98BE-438C-A90B-9EE8A852AB53}" type="datetime1">
+            <a:fld id="{81DC2A72-A33E-45CB-A0FC-944ED84863A3}" type="datetime1">
               <a:rPr lang="en-US" sz="1200" b="0" strike="noStrike" spc="-1">
                 <a:solidFill>
                   <a:srgbClr val="8B8B8B"/>
@@ -10885,7 +10925,7 @@
       </p:sp>
       <p:sp>
         <p:nvSpPr>
-          <p:cNvPr id="98" name="CustomShape 4"/>
+          <p:cNvPr id="93" name="CustomShape 4"/>
           <p:cNvSpPr/>
           <p:nvPr/>
         </p:nvSpPr>
@@ -10941,7 +10981,7 @@
       </p:sp>
       <p:sp>
         <p:nvSpPr>
-          <p:cNvPr id="99" name="CustomShape 5"/>
+          <p:cNvPr id="94" name="CustomShape 5"/>
           <p:cNvSpPr/>
           <p:nvPr/>
         </p:nvSpPr>
@@ -10979,7 +11019,7 @@
                 <a:spcPct val="100000"/>
               </a:lnSpc>
             </a:pPr>
-            <a:fld id="{0919CC1E-424D-4883-9099-73C515E82F43}" type="slidenum">
+            <a:fld id="{AFA6D8E6-8CD0-4C9D-8BDE-1DE6094BA3CC}" type="slidenum">
               <a:rPr lang="en-US" sz="1200" b="0" strike="noStrike" spc="-1">
                 <a:solidFill>
                   <a:srgbClr val="8B8B8B"/>
@@ -11152,7 +11192,7 @@
               <a:buChar char="•"/>
             </a:pPr>
             <a:r>
-              <a:rPr lang="en-US" sz="3200" b="0" strike="noStrike" spc="-1">
+              <a:rPr lang="en-US" sz="3200" b="0" strike="noStrike" spc="-1" dirty="0">
                 <a:solidFill>
                   <a:srgbClr val="000000"/>
                 </a:solidFill>
@@ -11161,7 +11201,7 @@
               </a:rPr>
               <a:t>Cyclone IV lowest end part</a:t>
             </a:r>
-            <a:endParaRPr lang="en-US" sz="3200" b="0" strike="noStrike" spc="-1">
+            <a:endParaRPr lang="en-US" sz="3200" b="0" strike="noStrike" spc="-1" dirty="0">
               <a:latin typeface="Arial"/>
             </a:endParaRPr>
           </a:p>
@@ -11180,7 +11220,7 @@
               <a:buChar char="•"/>
             </a:pPr>
             <a:r>
-              <a:rPr lang="en-US" sz="3200" b="0" strike="noStrike" spc="-1">
+              <a:rPr lang="en-US" sz="3200" b="0" strike="noStrike" spc="-1" dirty="0">
                 <a:solidFill>
                   <a:srgbClr val="000000"/>
                 </a:solidFill>
@@ -11189,7 +11229,7 @@
               </a:rPr>
               <a:t>Logic Elements (LEs) = 6276</a:t>
             </a:r>
-            <a:endParaRPr lang="en-US" sz="3200" b="0" strike="noStrike" spc="-1">
+            <a:endParaRPr lang="en-US" sz="3200" b="0" strike="noStrike" spc="-1" dirty="0">
               <a:latin typeface="Arial"/>
             </a:endParaRPr>
           </a:p>
@@ -11208,7 +11248,7 @@
               <a:buChar char="•"/>
             </a:pPr>
             <a:r>
-              <a:rPr lang="en-US" sz="3200" b="0" strike="noStrike" spc="-1">
+              <a:rPr lang="en-US" sz="3200" b="0" strike="noStrike" spc="-1" dirty="0">
                 <a:solidFill>
                   <a:srgbClr val="000000"/>
                 </a:solidFill>
@@ -11217,7 +11257,7 @@
               </a:rPr>
               <a:t>Embedded Memory (1Kx9 blocks) = 30</a:t>
             </a:r>
-            <a:endParaRPr lang="en-US" sz="3200" b="0" strike="noStrike" spc="-1">
+            <a:endParaRPr lang="en-US" sz="3200" b="0" strike="noStrike" spc="-1" dirty="0">
               <a:latin typeface="Arial"/>
             </a:endParaRPr>
           </a:p>
@@ -11236,7 +11276,7 @@
               <a:buChar char="•"/>
             </a:pPr>
             <a:r>
-              <a:rPr lang="en-US" sz="3200" b="0" strike="noStrike" spc="-1">
+              <a:rPr lang="en-US" sz="3200" b="0" strike="noStrike" spc="-1" dirty="0">
                 <a:solidFill>
                   <a:srgbClr val="000000"/>
                 </a:solidFill>
@@ -11245,7 +11285,7 @@
               </a:rPr>
               <a:t>These elements set the resource budgets</a:t>
             </a:r>
-            <a:endParaRPr lang="en-US" sz="3200" b="0" strike="noStrike" spc="-1">
+            <a:endParaRPr lang="en-US" sz="3200" b="0" strike="noStrike" spc="-1" dirty="0">
               <a:latin typeface="Arial"/>
             </a:endParaRPr>
           </a:p>
@@ -13487,7 +13527,7 @@
         </p:style>
         <p:txBody>
           <a:bodyPr lIns="90000" tIns="45000" rIns="90000" bIns="45000">
-            <a:normAutofit/>
+            <a:normAutofit fontScale="92500" lnSpcReduction="10000"/>
           </a:bodyPr>
           <a:lstStyle/>
           <a:p>

</xml_diff>